<commit_message>
Update Practical 02.1 - Classes and File Structure. Need to add screenshots
</commit_message>
<xml_diff>
--- a/Programming 4/01.2 Pointers/01.2 Pointers.pptx
+++ b/Programming 4/01.2 Pointers/01.2 Pointers.pptx
@@ -542,6 +542,10 @@
           <a:bodyPr/>
           <a:lstStyle/>
           <a:p>
+            <a:pPr marL="171450" indent="-171450">
+              <a:buFont typeface="Arial" charset="0"/>
+              <a:buChar char="•"/>
+            </a:pPr>
             <a:endParaRPr lang="en-US" dirty="0"/>
           </a:p>
         </p:txBody>
@@ -563,7 +567,7 @@
           <a:p>
             <a:fld id="{53A3F9FE-1503-3543-B430-F28961C3D43A}" type="slidenum">
               <a:rPr lang="en-US" smtClean="0"/>
-              <a:t>1</a:t>
+              <a:t>3</a:t>
             </a:fld>
             <a:endParaRPr lang="en-US"/>
           </a:p>
@@ -572,7 +576,7 @@
     </p:spTree>
     <p:extLst>
       <p:ext uri="{BB962C8B-B14F-4D97-AF65-F5344CB8AC3E}">
-        <p14:creationId xmlns:p14="http://schemas.microsoft.com/office/powerpoint/2010/main" val="42958813"/>
+        <p14:creationId xmlns:p14="http://schemas.microsoft.com/office/powerpoint/2010/main" val="1830264417"/>
       </p:ext>
     </p:extLst>
   </p:cSld>
@@ -626,6 +630,189 @@
           <a:bodyPr/>
           <a:lstStyle/>
           <a:p>
+            <a:pPr marL="171450" indent="-171450">
+              <a:buFont typeface="Arial" charset="0"/>
+              <a:buChar char="•"/>
+            </a:pPr>
+            <a:r>
+              <a:rPr lang="en-US" sz="1200" kern="1200" dirty="0" smtClean="0">
+                <a:solidFill>
+                  <a:schemeClr val="tx1"/>
+                </a:solidFill>
+                <a:effectLst/>
+                <a:latin typeface="+mn-lt"/>
+                <a:ea typeface="+mn-ea"/>
+                <a:cs typeface="+mn-cs"/>
+              </a:rPr>
+              <a:t>Pointer problems can get quite complicated, but the logic is always the same, just work through it carefully</a:t>
+            </a:r>
+          </a:p>
+          <a:p>
+            <a:pPr marL="171450" indent="-171450">
+              <a:buFont typeface="Arial" charset="0"/>
+              <a:buChar char="•"/>
+            </a:pPr>
+            <a:endParaRPr lang="en-US" sz="1200" kern="1200" dirty="0" smtClean="0">
+              <a:solidFill>
+                <a:schemeClr val="tx1"/>
+              </a:solidFill>
+              <a:effectLst/>
+              <a:latin typeface="+mn-lt"/>
+              <a:ea typeface="+mn-ea"/>
+              <a:cs typeface="+mn-cs"/>
+            </a:endParaRPr>
+          </a:p>
+          <a:p>
+            <a:pPr marL="171450" indent="-171450">
+              <a:buFont typeface="Arial" charset="0"/>
+              <a:buChar char="•"/>
+            </a:pPr>
+            <a:r>
+              <a:rPr lang="en-US" sz="1200" kern="1200" dirty="0" smtClean="0">
+                <a:solidFill>
+                  <a:schemeClr val="tx1"/>
+                </a:solidFill>
+                <a:effectLst/>
+                <a:latin typeface="+mn-lt"/>
+                <a:ea typeface="+mn-ea"/>
+                <a:cs typeface="+mn-cs"/>
+              </a:rPr>
+              <a:t>What are the values of aPtr, bPtr and cPtr? =&gt; Don’t know, they’re memory addresses</a:t>
+            </a:r>
+          </a:p>
+          <a:p>
+            <a:pPr marL="171450" indent="-171450">
+              <a:buFont typeface="Arial" charset="0"/>
+              <a:buChar char="•"/>
+            </a:pPr>
+            <a:endParaRPr lang="en-US" sz="1200" kern="1200" dirty="0" smtClean="0">
+              <a:solidFill>
+                <a:schemeClr val="tx1"/>
+              </a:solidFill>
+              <a:effectLst/>
+              <a:latin typeface="+mn-lt"/>
+              <a:ea typeface="+mn-ea"/>
+              <a:cs typeface="+mn-cs"/>
+            </a:endParaRPr>
+          </a:p>
+          <a:p>
+            <a:pPr marL="171450" indent="-171450">
+              <a:buFont typeface="Arial" charset="0"/>
+              <a:buChar char="•"/>
+            </a:pPr>
+            <a:r>
+              <a:rPr lang="en-US" sz="1200" kern="1200" dirty="0" smtClean="0">
+                <a:solidFill>
+                  <a:schemeClr val="tx1"/>
+                </a:solidFill>
+                <a:effectLst/>
+                <a:latin typeface="+mn-lt"/>
+                <a:ea typeface="+mn-ea"/>
+                <a:cs typeface="+mn-cs"/>
+              </a:rPr>
+              <a:t>What are the values of *aPtr, *bPtr and *cPtr? =&gt; All 45</a:t>
+            </a:r>
+          </a:p>
+          <a:p>
+            <a:pPr marL="171450" indent="-171450">
+              <a:buFont typeface="Arial" charset="0"/>
+              <a:buChar char="•"/>
+            </a:pPr>
+            <a:endParaRPr lang="en-US" sz="1200" kern="1200" dirty="0" smtClean="0">
+              <a:solidFill>
+                <a:schemeClr val="tx1"/>
+              </a:solidFill>
+              <a:effectLst/>
+              <a:latin typeface="+mn-lt"/>
+              <a:ea typeface="+mn-ea"/>
+              <a:cs typeface="+mn-cs"/>
+            </a:endParaRPr>
+          </a:p>
+          <a:p>
+            <a:pPr marL="171450" indent="-171450">
+              <a:buFont typeface="Arial" charset="0"/>
+              <a:buChar char="•"/>
+            </a:pPr>
+            <a:r>
+              <a:rPr lang="en-US" sz="1200" kern="1200" dirty="0" smtClean="0">
+                <a:solidFill>
+                  <a:schemeClr val="tx1"/>
+                </a:solidFill>
+                <a:effectLst/>
+                <a:latin typeface="+mn-lt"/>
+                <a:ea typeface="+mn-ea"/>
+                <a:cs typeface="+mn-cs"/>
+              </a:rPr>
+              <a:t>We’ll see lots more about pointers as we go. Don’t fret about all the operators – in practice, we don’t use them all that much in Visual C++</a:t>
+            </a:r>
+          </a:p>
+          <a:p>
+            <a:pPr marL="171450" indent="-171450">
+              <a:buFont typeface="Arial" charset="0"/>
+              <a:buChar char="•"/>
+            </a:pPr>
+            <a:endParaRPr lang="en-US" sz="1200" kern="1200" dirty="0" smtClean="0">
+              <a:solidFill>
+                <a:schemeClr val="tx1"/>
+              </a:solidFill>
+              <a:effectLst/>
+              <a:latin typeface="+mn-lt"/>
+              <a:ea typeface="+mn-ea"/>
+              <a:cs typeface="+mn-cs"/>
+            </a:endParaRPr>
+          </a:p>
+          <a:p>
+            <a:pPr marL="171450" indent="-171450">
+              <a:buFont typeface="Arial" charset="0"/>
+              <a:buChar char="•"/>
+            </a:pPr>
+            <a:r>
+              <a:rPr lang="en-US" sz="1200" kern="1200" dirty="0" smtClean="0">
+                <a:solidFill>
+                  <a:schemeClr val="tx1"/>
+                </a:solidFill>
+                <a:effectLst/>
+                <a:latin typeface="+mn-lt"/>
+                <a:ea typeface="+mn-ea"/>
+                <a:cs typeface="+mn-cs"/>
+              </a:rPr>
+              <a:t>What is critical is that you understand that pointers don’t hold the data themselves, they hold the address of the data</a:t>
+            </a:r>
+          </a:p>
+          <a:p>
+            <a:pPr marL="171450" indent="-171450">
+              <a:buFont typeface="Arial" charset="0"/>
+              <a:buChar char="•"/>
+            </a:pPr>
+            <a:endParaRPr lang="en-US" sz="1200" kern="1200" dirty="0" smtClean="0">
+              <a:solidFill>
+                <a:schemeClr val="tx1"/>
+              </a:solidFill>
+              <a:effectLst/>
+              <a:latin typeface="+mn-lt"/>
+              <a:ea typeface="+mn-ea"/>
+              <a:cs typeface="+mn-cs"/>
+            </a:endParaRPr>
+          </a:p>
+          <a:p>
+            <a:pPr marL="171450" indent="-171450">
+              <a:buFont typeface="Arial" charset="0"/>
+              <a:buChar char="•"/>
+            </a:pPr>
+            <a:r>
+              <a:rPr lang="en-US" sz="1200" kern="1200" dirty="0" smtClean="0">
+                <a:solidFill>
+                  <a:schemeClr val="tx1"/>
+                </a:solidFill>
+                <a:effectLst/>
+                <a:latin typeface="+mn-lt"/>
+                <a:ea typeface="+mn-ea"/>
+                <a:cs typeface="+mn-cs"/>
+              </a:rPr>
+              <a:t>Keep clear the difference between the value of a pointer (the address it holds) and the value of the data it points to (what you get when you dereference)</a:t>
+            </a:r>
+          </a:p>
+          <a:p>
             <a:endParaRPr lang="en-US" dirty="0"/>
           </a:p>
         </p:txBody>
@@ -647,7 +834,7 @@
           <a:p>
             <a:fld id="{53A3F9FE-1503-3543-B430-F28961C3D43A}" type="slidenum">
               <a:rPr lang="en-US" smtClean="0"/>
-              <a:t>14</a:t>
+              <a:t>15</a:t>
             </a:fld>
             <a:endParaRPr lang="en-US"/>
           </a:p>
@@ -656,7 +843,7 @@
     </p:spTree>
     <p:extLst>
       <p:ext uri="{BB962C8B-B14F-4D97-AF65-F5344CB8AC3E}">
-        <p14:creationId xmlns:p14="http://schemas.microsoft.com/office/powerpoint/2010/main" val="902101073"/>
+        <p14:creationId xmlns:p14="http://schemas.microsoft.com/office/powerpoint/2010/main" val="1261110000"/>
       </p:ext>
     </p:extLst>
   </p:cSld>
@@ -731,7 +918,7 @@
           <a:p>
             <a:fld id="{53A3F9FE-1503-3543-B430-F28961C3D43A}" type="slidenum">
               <a:rPr lang="en-US" smtClean="0"/>
-              <a:t>15</a:t>
+              <a:t>16</a:t>
             </a:fld>
             <a:endParaRPr lang="en-US"/>
           </a:p>
@@ -740,7 +927,7 @@
     </p:spTree>
     <p:extLst>
       <p:ext uri="{BB962C8B-B14F-4D97-AF65-F5344CB8AC3E}">
-        <p14:creationId xmlns:p14="http://schemas.microsoft.com/office/powerpoint/2010/main" val="1261110000"/>
+        <p14:creationId xmlns:p14="http://schemas.microsoft.com/office/powerpoint/2010/main" val="1275644589"/>
       </p:ext>
     </p:extLst>
   </p:cSld>
@@ -815,7 +1002,7 @@
           <a:p>
             <a:fld id="{53A3F9FE-1503-3543-B430-F28961C3D43A}" type="slidenum">
               <a:rPr lang="en-US" smtClean="0"/>
-              <a:t>16</a:t>
+              <a:t>17</a:t>
             </a:fld>
             <a:endParaRPr lang="en-US"/>
           </a:p>
@@ -824,7 +1011,7 @@
     </p:spTree>
     <p:extLst>
       <p:ext uri="{BB962C8B-B14F-4D97-AF65-F5344CB8AC3E}">
-        <p14:creationId xmlns:p14="http://schemas.microsoft.com/office/powerpoint/2010/main" val="1275644589"/>
+        <p14:creationId xmlns:p14="http://schemas.microsoft.com/office/powerpoint/2010/main" val="51386674"/>
       </p:ext>
     </p:extLst>
   </p:cSld>
@@ -878,6 +1065,123 @@
           <a:bodyPr/>
           <a:lstStyle/>
           <a:p>
+            <a:pPr marL="171450" indent="-171450">
+              <a:buFont typeface="Arial" charset="0"/>
+              <a:buChar char="•"/>
+            </a:pPr>
+            <a:r>
+              <a:rPr lang="en-US" sz="1200" kern="1200" dirty="0" smtClean="0">
+                <a:solidFill>
+                  <a:schemeClr val="tx1"/>
+                </a:solidFill>
+                <a:effectLst/>
+                <a:latin typeface="+mn-lt"/>
+                <a:ea typeface="+mn-ea"/>
+                <a:cs typeface="+mn-cs"/>
+              </a:rPr>
+              <a:t>unmanagedPtr is a pointer to an instance of myClass</a:t>
+            </a:r>
+          </a:p>
+          <a:p>
+            <a:pPr marL="171450" indent="-171450">
+              <a:buFont typeface="Arial" charset="0"/>
+              <a:buChar char="•"/>
+            </a:pPr>
+            <a:endParaRPr lang="en-US" sz="1200" kern="1200" dirty="0" smtClean="0">
+              <a:solidFill>
+                <a:schemeClr val="tx1"/>
+              </a:solidFill>
+              <a:effectLst/>
+              <a:latin typeface="+mn-lt"/>
+              <a:ea typeface="+mn-ea"/>
+              <a:cs typeface="+mn-cs"/>
+            </a:endParaRPr>
+          </a:p>
+          <a:p>
+            <a:pPr marL="171450" indent="-171450">
+              <a:buFont typeface="Arial" charset="0"/>
+              <a:buChar char="•"/>
+            </a:pPr>
+            <a:r>
+              <a:rPr lang="en-US" sz="1200" kern="1200" dirty="0" smtClean="0">
+                <a:solidFill>
+                  <a:schemeClr val="tx1"/>
+                </a:solidFill>
+                <a:effectLst/>
+                <a:latin typeface="+mn-lt"/>
+                <a:ea typeface="+mn-ea"/>
+                <a:cs typeface="+mn-cs"/>
+              </a:rPr>
+              <a:t>The object unmanagedPtr points to will not move, and we must free its memory ourselves</a:t>
+            </a:r>
+          </a:p>
+          <a:p>
+            <a:pPr marL="171450" indent="-171450">
+              <a:buFont typeface="Arial" charset="0"/>
+              <a:buChar char="•"/>
+            </a:pPr>
+            <a:endParaRPr lang="en-US" sz="1200" kern="1200" dirty="0" smtClean="0">
+              <a:solidFill>
+                <a:schemeClr val="tx1"/>
+              </a:solidFill>
+              <a:effectLst/>
+              <a:latin typeface="+mn-lt"/>
+              <a:ea typeface="+mn-ea"/>
+              <a:cs typeface="+mn-cs"/>
+            </a:endParaRPr>
+          </a:p>
+          <a:p>
+            <a:pPr marL="171450" indent="-171450">
+              <a:buFont typeface="Arial" charset="0"/>
+              <a:buChar char="•"/>
+            </a:pPr>
+            <a:r>
+              <a:rPr lang="en-US" sz="1200" kern="1200" dirty="0" smtClean="0">
+                <a:solidFill>
+                  <a:schemeClr val="tx1"/>
+                </a:solidFill>
+                <a:effectLst/>
+                <a:latin typeface="+mn-lt"/>
+                <a:ea typeface="+mn-ea"/>
+                <a:cs typeface="+mn-cs"/>
+              </a:rPr>
+              <a:t>managedPtr is a handle to an instance of myClass</a:t>
+            </a:r>
+          </a:p>
+          <a:p>
+            <a:pPr marL="171450" indent="-171450">
+              <a:buFont typeface="Arial" charset="0"/>
+              <a:buChar char="•"/>
+            </a:pPr>
+            <a:endParaRPr lang="en-US" sz="1200" kern="1200" dirty="0" smtClean="0">
+              <a:solidFill>
+                <a:schemeClr val="tx1"/>
+              </a:solidFill>
+              <a:effectLst/>
+              <a:latin typeface="+mn-lt"/>
+              <a:ea typeface="+mn-ea"/>
+              <a:cs typeface="+mn-cs"/>
+            </a:endParaRPr>
+          </a:p>
+          <a:p>
+            <a:pPr marL="171450" indent="-171450">
+              <a:buFont typeface="Arial" charset="0"/>
+              <a:buChar char="•"/>
+            </a:pPr>
+            <a:r>
+              <a:rPr lang="en-US" sz="1200" kern="1200" dirty="0" smtClean="0">
+                <a:solidFill>
+                  <a:schemeClr val="tx1"/>
+                </a:solidFill>
+                <a:effectLst/>
+                <a:latin typeface="+mn-lt"/>
+                <a:ea typeface="+mn-ea"/>
+                <a:cs typeface="+mn-cs"/>
+              </a:rPr>
+              <a:t>The object managedPtr points to may move, and the system will free its memory when nobody is pointing to it</a:t>
+            </a:r>
+          </a:p>
+          <a:p>
             <a:endParaRPr lang="en-US" dirty="0"/>
           </a:p>
         </p:txBody>
@@ -899,7 +1203,7 @@
           <a:p>
             <a:fld id="{53A3F9FE-1503-3543-B430-F28961C3D43A}" type="slidenum">
               <a:rPr lang="en-US" smtClean="0"/>
-              <a:t>17</a:t>
+              <a:t>18</a:t>
             </a:fld>
             <a:endParaRPr lang="en-US"/>
           </a:p>
@@ -908,7 +1212,7 @@
     </p:spTree>
     <p:extLst>
       <p:ext uri="{BB962C8B-B14F-4D97-AF65-F5344CB8AC3E}">
-        <p14:creationId xmlns:p14="http://schemas.microsoft.com/office/powerpoint/2010/main" val="51386674"/>
+        <p14:creationId xmlns:p14="http://schemas.microsoft.com/office/powerpoint/2010/main" val="45899615"/>
       </p:ext>
     </p:extLst>
   </p:cSld>
@@ -983,7 +1287,7 @@
           <a:p>
             <a:fld id="{53A3F9FE-1503-3543-B430-F28961C3D43A}" type="slidenum">
               <a:rPr lang="en-US" smtClean="0"/>
-              <a:t>18</a:t>
+              <a:t>19</a:t>
             </a:fld>
             <a:endParaRPr lang="en-US"/>
           </a:p>
@@ -992,7 +1296,7 @@
     </p:spTree>
     <p:extLst>
       <p:ext uri="{BB962C8B-B14F-4D97-AF65-F5344CB8AC3E}">
-        <p14:creationId xmlns:p14="http://schemas.microsoft.com/office/powerpoint/2010/main" val="45899615"/>
+        <p14:creationId xmlns:p14="http://schemas.microsoft.com/office/powerpoint/2010/main" val="2127813185"/>
       </p:ext>
     </p:extLst>
   </p:cSld>
@@ -1067,7 +1371,7 @@
           <a:p>
             <a:fld id="{53A3F9FE-1503-3543-B430-F28961C3D43A}" type="slidenum">
               <a:rPr lang="en-US" smtClean="0"/>
-              <a:t>19</a:t>
+              <a:t>20</a:t>
             </a:fld>
             <a:endParaRPr lang="en-US"/>
           </a:p>
@@ -1076,7 +1380,7 @@
     </p:spTree>
     <p:extLst>
       <p:ext uri="{BB962C8B-B14F-4D97-AF65-F5344CB8AC3E}">
-        <p14:creationId xmlns:p14="http://schemas.microsoft.com/office/powerpoint/2010/main" val="2127813185"/>
+        <p14:creationId xmlns:p14="http://schemas.microsoft.com/office/powerpoint/2010/main" val="482754960"/>
       </p:ext>
     </p:extLst>
   </p:cSld>
@@ -1151,7 +1455,7 @@
           <a:p>
             <a:fld id="{53A3F9FE-1503-3543-B430-F28961C3D43A}" type="slidenum">
               <a:rPr lang="en-US" smtClean="0"/>
-              <a:t>20</a:t>
+              <a:t>21</a:t>
             </a:fld>
             <a:endParaRPr lang="en-US"/>
           </a:p>
@@ -1160,7 +1464,7 @@
     </p:spTree>
     <p:extLst>
       <p:ext uri="{BB962C8B-B14F-4D97-AF65-F5344CB8AC3E}">
-        <p14:creationId xmlns:p14="http://schemas.microsoft.com/office/powerpoint/2010/main" val="482754960"/>
+        <p14:creationId xmlns:p14="http://schemas.microsoft.com/office/powerpoint/2010/main" val="2032508120"/>
       </p:ext>
     </p:extLst>
   </p:cSld>
@@ -1235,90 +1539,6 @@
           <a:p>
             <a:fld id="{53A3F9FE-1503-3543-B430-F28961C3D43A}" type="slidenum">
               <a:rPr lang="en-US" smtClean="0"/>
-              <a:t>21</a:t>
-            </a:fld>
-            <a:endParaRPr lang="en-US"/>
-          </a:p>
-        </p:txBody>
-      </p:sp>
-    </p:spTree>
-    <p:extLst>
-      <p:ext uri="{BB962C8B-B14F-4D97-AF65-F5344CB8AC3E}">
-        <p14:creationId xmlns:p14="http://schemas.microsoft.com/office/powerpoint/2010/main" val="2032508120"/>
-      </p:ext>
-    </p:extLst>
-  </p:cSld>
-  <p:clrMapOvr>
-    <a:masterClrMapping/>
-  </p:clrMapOvr>
-</p:notes>
-</file>
-
-<file path=ppt/notesSlides/notesSlide18.xml><?xml version="1.0" encoding="utf-8"?>
-<p:notes xmlns:a="http://schemas.openxmlformats.org/drawingml/2006/main" xmlns:r="http://schemas.openxmlformats.org/officeDocument/2006/relationships" xmlns:p="http://schemas.openxmlformats.org/presentationml/2006/main">
-  <p:cSld>
-    <p:spTree>
-      <p:nvGrpSpPr>
-        <p:cNvPr id="1" name=""/>
-        <p:cNvGrpSpPr/>
-        <p:nvPr/>
-      </p:nvGrpSpPr>
-      <p:grpSpPr>
-        <a:xfrm>
-          <a:off x="0" y="0"/>
-          <a:ext cx="0" cy="0"/>
-          <a:chOff x="0" y="0"/>
-          <a:chExt cx="0" cy="0"/>
-        </a:xfrm>
-      </p:grpSpPr>
-      <p:sp>
-        <p:nvSpPr>
-          <p:cNvPr id="2" name="Slide Image Placeholder 1"/>
-          <p:cNvSpPr>
-            <a:spLocks noGrp="1" noRot="1" noChangeAspect="1"/>
-          </p:cNvSpPr>
-          <p:nvPr>
-            <p:ph type="sldImg"/>
-          </p:nvPr>
-        </p:nvSpPr>
-        <p:spPr/>
-      </p:sp>
-      <p:sp>
-        <p:nvSpPr>
-          <p:cNvPr id="3" name="Notes Placeholder 2"/>
-          <p:cNvSpPr>
-            <a:spLocks noGrp="1"/>
-          </p:cNvSpPr>
-          <p:nvPr>
-            <p:ph type="body" idx="1"/>
-          </p:nvPr>
-        </p:nvSpPr>
-        <p:spPr/>
-        <p:txBody>
-          <a:bodyPr/>
-          <a:lstStyle/>
-          <a:p>
-            <a:endParaRPr lang="en-US" dirty="0"/>
-          </a:p>
-        </p:txBody>
-      </p:sp>
-      <p:sp>
-        <p:nvSpPr>
-          <p:cNvPr id="4" name="Slide Number Placeholder 3"/>
-          <p:cNvSpPr>
-            <a:spLocks noGrp="1"/>
-          </p:cNvSpPr>
-          <p:nvPr>
-            <p:ph type="sldNum" sz="quarter" idx="10"/>
-          </p:nvPr>
-        </p:nvSpPr>
-        <p:spPr/>
-        <p:txBody>
-          <a:bodyPr/>
-          <a:lstStyle/>
-          <a:p>
-            <a:fld id="{53A3F9FE-1503-3543-B430-F28961C3D43A}" type="slidenum">
-              <a:rPr lang="en-US" smtClean="0"/>
               <a:t>22</a:t>
             </a:fld>
             <a:endParaRPr lang="en-US"/>
@@ -1338,7 +1558,7 @@
 </p:notes>
 </file>
 
-<file path=ppt/notesSlides/notesSlide19.xml><?xml version="1.0" encoding="utf-8"?>
+<file path=ppt/notesSlides/notesSlide18.xml><?xml version="1.0" encoding="utf-8"?>
 <p:notes xmlns:a="http://schemas.openxmlformats.org/drawingml/2006/main" xmlns:r="http://schemas.openxmlformats.org/officeDocument/2006/relationships" xmlns:p="http://schemas.openxmlformats.org/presentationml/2006/main">
   <p:cSld>
     <p:spTree>
@@ -1470,7 +1690,83 @@
               <a:buFont typeface="Arial" charset="0"/>
               <a:buChar char="•"/>
             </a:pPr>
-            <a:endParaRPr lang="en-US" dirty="0"/>
+            <a:r>
+              <a:rPr lang="en-US" sz="1200" kern="1200" dirty="0" smtClean="0">
+                <a:solidFill>
+                  <a:schemeClr val="tx1"/>
+                </a:solidFill>
+                <a:effectLst/>
+                <a:latin typeface="+mn-lt"/>
+                <a:ea typeface="+mn-ea"/>
+                <a:cs typeface="+mn-cs"/>
+              </a:rPr>
+              <a:t>The memory</a:t>
+            </a:r>
+            <a:r>
+              <a:rPr lang="en-US" sz="1200" kern="1200" baseline="0" dirty="0" smtClean="0">
+                <a:solidFill>
+                  <a:schemeClr val="tx1"/>
+                </a:solidFill>
+                <a:effectLst/>
+                <a:latin typeface="+mn-lt"/>
+                <a:ea typeface="+mn-ea"/>
+                <a:cs typeface="+mn-cs"/>
+              </a:rPr>
+              <a:t> addresses aren’t really small numbers like 115, 116, 117, etc</a:t>
+            </a:r>
+          </a:p>
+          <a:p>
+            <a:pPr marL="171450" indent="-171450">
+              <a:buFont typeface="Arial" charset="0"/>
+              <a:buChar char="•"/>
+            </a:pPr>
+            <a:endParaRPr lang="en-US" sz="1200" kern="1200" baseline="0" dirty="0" smtClean="0">
+              <a:solidFill>
+                <a:schemeClr val="tx1"/>
+              </a:solidFill>
+              <a:effectLst/>
+              <a:latin typeface="+mn-lt"/>
+              <a:ea typeface="+mn-ea"/>
+              <a:cs typeface="+mn-cs"/>
+            </a:endParaRPr>
+          </a:p>
+          <a:p>
+            <a:pPr marL="171450" indent="-171450">
+              <a:buFont typeface="Arial" charset="0"/>
+              <a:buChar char="•"/>
+            </a:pPr>
+            <a:r>
+              <a:rPr lang="en-US" sz="1200" kern="1200" baseline="0" dirty="0" smtClean="0">
+                <a:solidFill>
+                  <a:schemeClr val="tx1"/>
+                </a:solidFill>
+                <a:effectLst/>
+                <a:latin typeface="+mn-lt"/>
+                <a:ea typeface="+mn-ea"/>
+                <a:cs typeface="+mn-cs"/>
+              </a:rPr>
+              <a:t>They are big gigabyte like numbers but the logic is the same</a:t>
+            </a:r>
+            <a:endParaRPr lang="en-US" sz="1200" kern="1200" dirty="0" smtClean="0">
+              <a:solidFill>
+                <a:schemeClr val="tx1"/>
+              </a:solidFill>
+              <a:effectLst/>
+              <a:latin typeface="+mn-lt"/>
+              <a:ea typeface="+mn-ea"/>
+              <a:cs typeface="+mn-cs"/>
+            </a:endParaRPr>
+          </a:p>
+          <a:p>
+            <a:endParaRPr lang="en-US" sz="1200" kern="1200" dirty="0" smtClean="0">
+              <a:solidFill>
+                <a:schemeClr val="tx1"/>
+              </a:solidFill>
+              <a:effectLst/>
+              <a:latin typeface="+mn-lt"/>
+              <a:ea typeface="+mn-ea"/>
+              <a:cs typeface="+mn-cs"/>
+            </a:endParaRPr>
           </a:p>
         </p:txBody>
       </p:sp>
@@ -1491,7 +1787,7 @@
           <a:p>
             <a:fld id="{53A3F9FE-1503-3543-B430-F28961C3D43A}" type="slidenum">
               <a:rPr lang="en-US" smtClean="0"/>
-              <a:t>3</a:t>
+              <a:t>4</a:t>
             </a:fld>
             <a:endParaRPr lang="en-US"/>
           </a:p>
@@ -1500,7 +1796,7 @@
     </p:spTree>
     <p:extLst>
       <p:ext uri="{BB962C8B-B14F-4D97-AF65-F5344CB8AC3E}">
-        <p14:creationId xmlns:p14="http://schemas.microsoft.com/office/powerpoint/2010/main" val="1830264417"/>
+        <p14:creationId xmlns:p14="http://schemas.microsoft.com/office/powerpoint/2010/main" val="1900681537"/>
       </p:ext>
     </p:extLst>
   </p:cSld>
@@ -1554,6 +1850,78 @@
           <a:bodyPr/>
           <a:lstStyle/>
           <a:p>
+            <a:pPr marL="171450" marR="0" indent="-171450" algn="l" defTabSz="914400" rtl="0" eaLnBrk="1" fontAlgn="auto" latinLnBrk="0" hangingPunct="1">
+              <a:lnSpc>
+                <a:spcPct val="100000"/>
+              </a:lnSpc>
+              <a:spcBef>
+                <a:spcPts val="0"/>
+              </a:spcBef>
+              <a:spcAft>
+                <a:spcPts val="0"/>
+              </a:spcAft>
+              <a:buClrTx/>
+              <a:buSzTx/>
+              <a:buFont typeface="Arial" charset="0"/>
+              <a:buChar char="•"/>
+              <a:tabLst/>
+              <a:defRPr/>
+            </a:pPr>
+            <a:r>
+              <a:rPr lang="en-US" sz="1200" kern="1200" dirty="0" smtClean="0">
+                <a:solidFill>
+                  <a:schemeClr val="tx1"/>
+                </a:solidFill>
+                <a:effectLst/>
+                <a:latin typeface="+mn-lt"/>
+                <a:ea typeface="+mn-ea"/>
+                <a:cs typeface="+mn-cs"/>
+              </a:rPr>
+              <a:t>Pointer variables can only ever hold a memory address. The same way </a:t>
+            </a:r>
+            <a:r>
+              <a:rPr lang="en-US" sz="1200" kern="1200" dirty="0" err="1" smtClean="0">
+                <a:solidFill>
+                  <a:schemeClr val="tx1"/>
+                </a:solidFill>
+                <a:effectLst/>
+                <a:latin typeface="+mn-lt"/>
+                <a:ea typeface="+mn-ea"/>
+                <a:cs typeface="+mn-cs"/>
+              </a:rPr>
+              <a:t>ints</a:t>
+            </a:r>
+            <a:r>
+              <a:rPr lang="en-US" sz="1200" kern="1200" dirty="0" smtClean="0">
+                <a:solidFill>
+                  <a:schemeClr val="tx1"/>
+                </a:solidFill>
+                <a:effectLst/>
+                <a:latin typeface="+mn-lt"/>
+                <a:ea typeface="+mn-ea"/>
+                <a:cs typeface="+mn-cs"/>
+              </a:rPr>
+              <a:t> can only hold whole numbers, or a bool can only hold true or false.</a:t>
+            </a:r>
+          </a:p>
+          <a:p>
+            <a:pPr marL="171450" marR="0" indent="-171450" algn="l" defTabSz="914400" rtl="0" eaLnBrk="1" fontAlgn="auto" latinLnBrk="0" hangingPunct="1">
+              <a:lnSpc>
+                <a:spcPct val="100000"/>
+              </a:lnSpc>
+              <a:spcBef>
+                <a:spcPts val="0"/>
+              </a:spcBef>
+              <a:spcAft>
+                <a:spcPts val="0"/>
+              </a:spcAft>
+              <a:buClrTx/>
+              <a:buSzTx/>
+              <a:buFont typeface="Arial" charset="0"/>
+              <a:buChar char="•"/>
+              <a:tabLst/>
+              <a:defRPr/>
+            </a:pPr>
             <a:endParaRPr lang="en-US" sz="1200" kern="1200" dirty="0" smtClean="0">
               <a:solidFill>
                 <a:schemeClr val="tx1"/>
@@ -1564,6 +1932,64 @@
               <a:cs typeface="+mn-cs"/>
             </a:endParaRPr>
           </a:p>
+          <a:p>
+            <a:pPr marL="171450" marR="0" indent="-171450" algn="l" defTabSz="914400" rtl="0" eaLnBrk="1" fontAlgn="auto" latinLnBrk="0" hangingPunct="1">
+              <a:lnSpc>
+                <a:spcPct val="100000"/>
+              </a:lnSpc>
+              <a:spcBef>
+                <a:spcPts val="0"/>
+              </a:spcBef>
+              <a:spcAft>
+                <a:spcPts val="0"/>
+              </a:spcAft>
+              <a:buClrTx/>
+              <a:buSzTx/>
+              <a:buFont typeface="Arial" charset="0"/>
+              <a:buChar char="•"/>
+              <a:tabLst/>
+              <a:defRPr/>
+            </a:pPr>
+            <a:r>
+              <a:rPr lang="en-US" sz="1200" kern="1200" dirty="0" smtClean="0">
+                <a:solidFill>
+                  <a:schemeClr val="tx1"/>
+                </a:solidFill>
+                <a:effectLst/>
+                <a:latin typeface="+mn-lt"/>
+                <a:ea typeface="+mn-ea"/>
+                <a:cs typeface="+mn-cs"/>
+              </a:rPr>
+              <a:t>With C++ is that some kinds of data can be dealt with </a:t>
+            </a:r>
+            <a:r>
+              <a:rPr lang="en-US" sz="1200" b="1" kern="1200" dirty="0" smtClean="0">
+                <a:solidFill>
+                  <a:schemeClr val="tx1"/>
+                </a:solidFill>
+                <a:effectLst/>
+                <a:latin typeface="+mn-lt"/>
+                <a:ea typeface="+mn-ea"/>
+                <a:cs typeface="+mn-cs"/>
+              </a:rPr>
+              <a:t>only</a:t>
+            </a:r>
+            <a:r>
+              <a:rPr lang="en-US" sz="1200" kern="1200" dirty="0" smtClean="0">
+                <a:solidFill>
+                  <a:schemeClr val="tx1"/>
+                </a:solidFill>
+                <a:effectLst/>
+                <a:latin typeface="+mn-lt"/>
+                <a:ea typeface="+mn-ea"/>
+                <a:cs typeface="+mn-cs"/>
+              </a:rPr>
+              <a:t> via pointers</a:t>
+            </a:r>
+          </a:p>
+          <a:p>
+            <a:endParaRPr lang="en-US" dirty="0"/>
+          </a:p>
         </p:txBody>
       </p:sp>
       <p:sp>
@@ -1583,7 +2009,7 @@
           <a:p>
             <a:fld id="{53A3F9FE-1503-3543-B430-F28961C3D43A}" type="slidenum">
               <a:rPr lang="en-US" smtClean="0"/>
-              <a:t>4</a:t>
+              <a:t>5</a:t>
             </a:fld>
             <a:endParaRPr lang="en-US"/>
           </a:p>
@@ -1592,7 +2018,7 @@
     </p:spTree>
     <p:extLst>
       <p:ext uri="{BB962C8B-B14F-4D97-AF65-F5344CB8AC3E}">
-        <p14:creationId xmlns:p14="http://schemas.microsoft.com/office/powerpoint/2010/main" val="1900681537"/>
+        <p14:creationId xmlns:p14="http://schemas.microsoft.com/office/powerpoint/2010/main" val="1743962512"/>
       </p:ext>
     </p:extLst>
   </p:cSld>
@@ -1646,6 +2072,37 @@
           <a:bodyPr/>
           <a:lstStyle/>
           <a:p>
+            <a:pPr marL="171450" marR="0" indent="-171450" algn="l" defTabSz="914400" rtl="0" eaLnBrk="1" fontAlgn="auto" latinLnBrk="0" hangingPunct="1">
+              <a:lnSpc>
+                <a:spcPct val="100000"/>
+              </a:lnSpc>
+              <a:spcBef>
+                <a:spcPts val="0"/>
+              </a:spcBef>
+              <a:spcAft>
+                <a:spcPts val="0"/>
+              </a:spcAft>
+              <a:buClrTx/>
+              <a:buSzTx/>
+              <a:buFont typeface="Arial" charset="0"/>
+              <a:buChar char="•"/>
+              <a:tabLst/>
+              <a:defRPr/>
+            </a:pPr>
+            <a:r>
+              <a:rPr lang="en-US" sz="1200" kern="1200" dirty="0" smtClean="0">
+                <a:solidFill>
+                  <a:schemeClr val="tx1"/>
+                </a:solidFill>
+                <a:effectLst/>
+                <a:latin typeface="+mn-lt"/>
+                <a:ea typeface="+mn-ea"/>
+                <a:cs typeface="+mn-cs"/>
+              </a:rPr>
+              <a:t>The compiler doesn’t get confused between * as “this is a pointer” and * as “multiply”</a:t>
+            </a:r>
+          </a:p>
+          <a:p>
             <a:endParaRPr lang="en-US" dirty="0"/>
           </a:p>
         </p:txBody>
@@ -1667,7 +2124,7 @@
           <a:p>
             <a:fld id="{53A3F9FE-1503-3543-B430-F28961C3D43A}" type="slidenum">
               <a:rPr lang="en-US" smtClean="0"/>
-              <a:t>5</a:t>
+              <a:t>6</a:t>
             </a:fld>
             <a:endParaRPr lang="en-US"/>
           </a:p>
@@ -1676,7 +2133,7 @@
     </p:spTree>
     <p:extLst>
       <p:ext uri="{BB962C8B-B14F-4D97-AF65-F5344CB8AC3E}">
-        <p14:creationId xmlns:p14="http://schemas.microsoft.com/office/powerpoint/2010/main" val="1743962512"/>
+        <p14:creationId xmlns:p14="http://schemas.microsoft.com/office/powerpoint/2010/main" val="1665751023"/>
       </p:ext>
     </p:extLst>
   </p:cSld>
@@ -1730,6 +2187,60 @@
           <a:bodyPr/>
           <a:lstStyle/>
           <a:p>
+            <a:pPr marL="171450" indent="-171450">
+              <a:buFont typeface="Arial" charset="0"/>
+              <a:buChar char="•"/>
+            </a:pPr>
+            <a:r>
+              <a:rPr lang="en-US" sz="1200" kern="1200" dirty="0" smtClean="0">
+                <a:solidFill>
+                  <a:schemeClr val="tx1"/>
+                </a:solidFill>
+                <a:effectLst/>
+                <a:latin typeface="+mn-lt"/>
+                <a:ea typeface="+mn-ea"/>
+                <a:cs typeface="+mn-cs"/>
+              </a:rPr>
+              <a:t>numPtr is assigned the address returned by the new, so it “points to” that address</a:t>
+            </a:r>
+          </a:p>
+          <a:p>
+            <a:pPr marL="171450" indent="-171450">
+              <a:buFont typeface="Arial" charset="0"/>
+              <a:buChar char="•"/>
+            </a:pPr>
+            <a:r>
+              <a:rPr lang="en-US" sz="1200" kern="1200" dirty="0" smtClean="0">
+                <a:solidFill>
+                  <a:schemeClr val="tx1"/>
+                </a:solidFill>
+                <a:effectLst/>
+                <a:latin typeface="+mn-lt"/>
+                <a:ea typeface="+mn-ea"/>
+                <a:cs typeface="+mn-cs"/>
+              </a:rPr>
+              <a:t>It may seem silly to go through all this trouble when we could just create an int. And in fact, when working with simple primitive types like int, we don’t usually bother with pointers</a:t>
+            </a:r>
+          </a:p>
+          <a:p>
+            <a:pPr marL="171450" indent="-171450">
+              <a:buFont typeface="Arial" charset="0"/>
+              <a:buChar char="•"/>
+            </a:pPr>
+            <a:r>
+              <a:rPr lang="en-US" sz="1200" kern="1200" dirty="0" smtClean="0">
+                <a:solidFill>
+                  <a:schemeClr val="tx1"/>
+                </a:solidFill>
+                <a:effectLst/>
+                <a:latin typeface="+mn-lt"/>
+                <a:ea typeface="+mn-ea"/>
+                <a:cs typeface="+mn-cs"/>
+              </a:rPr>
+              <a:t>We must remember that user-defined classes and complex system classes like buttons *must* be managed via pointers – C++ requires this</a:t>
+            </a:r>
+          </a:p>
+          <a:p>
             <a:pPr marL="171450" marR="0" indent="-171450" algn="l" defTabSz="914400" rtl="0" eaLnBrk="1" fontAlgn="auto" latinLnBrk="0" hangingPunct="1">
               <a:lnSpc>
                 <a:spcPct val="100000"/>
@@ -1757,7 +2268,31 @@
                 <a:ea typeface="+mn-ea"/>
                 <a:cs typeface="+mn-cs"/>
               </a:rPr>
-              <a:t>The compiler doesn’t get confused between * as “this is a pointer” and * as “multiply”</a:t>
+              <a:t>When</a:t>
+            </a:r>
+            <a:r>
+              <a:rPr lang="en-US" sz="1200" kern="1200" baseline="0" dirty="0" smtClean="0">
+                <a:solidFill>
+                  <a:schemeClr val="tx1"/>
+                </a:solidFill>
+                <a:effectLst/>
+                <a:latin typeface="+mn-lt"/>
+                <a:ea typeface="+mn-ea"/>
+                <a:cs typeface="+mn-cs"/>
+              </a:rPr>
+              <a:t> w</a:t>
+            </a:r>
+            <a:r>
+              <a:rPr lang="en-US" sz="1200" kern="1200" dirty="0" smtClean="0">
+                <a:solidFill>
+                  <a:schemeClr val="tx1"/>
+                </a:solidFill>
+                <a:effectLst/>
+                <a:latin typeface="+mn-lt"/>
+                <a:ea typeface="+mn-ea"/>
+                <a:cs typeface="+mn-cs"/>
+              </a:rPr>
+              <a:t>e first meet pointers, it is easier to understand them when using something simple like an int</a:t>
             </a:r>
           </a:p>
           <a:p>
@@ -1782,7 +2317,7 @@
           <a:p>
             <a:fld id="{53A3F9FE-1503-3543-B430-F28961C3D43A}" type="slidenum">
               <a:rPr lang="en-US" smtClean="0"/>
-              <a:t>6</a:t>
+              <a:t>9</a:t>
             </a:fld>
             <a:endParaRPr lang="en-US"/>
           </a:p>
@@ -1791,7 +2326,7 @@
     </p:spTree>
     <p:extLst>
       <p:ext uri="{BB962C8B-B14F-4D97-AF65-F5344CB8AC3E}">
-        <p14:creationId xmlns:p14="http://schemas.microsoft.com/office/powerpoint/2010/main" val="1665751023"/>
+        <p14:creationId xmlns:p14="http://schemas.microsoft.com/office/powerpoint/2010/main" val="782160691"/>
       </p:ext>
     </p:extLst>
   </p:cSld>
@@ -1845,7 +2380,7 @@
           <a:bodyPr/>
           <a:lstStyle/>
           <a:p>
-            <a:endParaRPr lang="en-US" dirty="0" smtClean="0"/>
+            <a:endParaRPr lang="en-US" dirty="0"/>
           </a:p>
         </p:txBody>
       </p:sp>
@@ -1866,7 +2401,7 @@
           <a:p>
             <a:fld id="{53A3F9FE-1503-3543-B430-F28961C3D43A}" type="slidenum">
               <a:rPr lang="en-US" smtClean="0"/>
-              <a:t>9</a:t>
+              <a:t>11</a:t>
             </a:fld>
             <a:endParaRPr lang="en-US"/>
           </a:p>
@@ -1875,7 +2410,7 @@
     </p:spTree>
     <p:extLst>
       <p:ext uri="{BB962C8B-B14F-4D97-AF65-F5344CB8AC3E}">
-        <p14:creationId xmlns:p14="http://schemas.microsoft.com/office/powerpoint/2010/main" val="782160691"/>
+        <p14:creationId xmlns:p14="http://schemas.microsoft.com/office/powerpoint/2010/main" val="1544445874"/>
       </p:ext>
     </p:extLst>
   </p:cSld>
@@ -1929,6 +2464,10 @@
           <a:bodyPr/>
           <a:lstStyle/>
           <a:p>
+            <a:r>
+              <a:rPr lang="en-US" dirty="0" smtClean="0"/>
+              <a:t>i = 15</a:t>
+            </a:r>
             <a:endParaRPr lang="en-US" dirty="0"/>
           </a:p>
         </p:txBody>
@@ -1950,7 +2489,7 @@
           <a:p>
             <a:fld id="{53A3F9FE-1503-3543-B430-F28961C3D43A}" type="slidenum">
               <a:rPr lang="en-US" smtClean="0"/>
-              <a:t>11</a:t>
+              <a:t>12</a:t>
             </a:fld>
             <a:endParaRPr lang="en-US"/>
           </a:p>
@@ -1959,7 +2498,7 @@
     </p:spTree>
     <p:extLst>
       <p:ext uri="{BB962C8B-B14F-4D97-AF65-F5344CB8AC3E}">
-        <p14:creationId xmlns:p14="http://schemas.microsoft.com/office/powerpoint/2010/main" val="1544445874"/>
+        <p14:creationId xmlns:p14="http://schemas.microsoft.com/office/powerpoint/2010/main" val="371083508"/>
       </p:ext>
     </p:extLst>
   </p:cSld>
@@ -2013,6 +2552,57 @@
           <a:bodyPr/>
           <a:lstStyle/>
           <a:p>
+            <a:pPr marL="171450" indent="-171450">
+              <a:buFont typeface="Arial" charset="0"/>
+              <a:buChar char="•"/>
+            </a:pPr>
+            <a:r>
+              <a:rPr lang="en-US" sz="1200" kern="1200" dirty="0" smtClean="0">
+                <a:solidFill>
+                  <a:schemeClr val="tx1"/>
+                </a:solidFill>
+                <a:effectLst/>
+                <a:latin typeface="+mn-lt"/>
+                <a:ea typeface="+mn-ea"/>
+                <a:cs typeface="+mn-cs"/>
+              </a:rPr>
+              <a:t>When assigning to *numPtr, we are assigning to “the variable numPtr is pointing to”</a:t>
+            </a:r>
+          </a:p>
+          <a:p>
+            <a:pPr marL="171450" indent="-171450">
+              <a:buFont typeface="Arial" charset="0"/>
+              <a:buChar char="•"/>
+            </a:pPr>
+            <a:endParaRPr lang="en-US" sz="1200" kern="1200" dirty="0" smtClean="0">
+              <a:solidFill>
+                <a:schemeClr val="tx1"/>
+              </a:solidFill>
+              <a:effectLst/>
+              <a:latin typeface="+mn-lt"/>
+              <a:ea typeface="+mn-ea"/>
+              <a:cs typeface="+mn-cs"/>
+            </a:endParaRPr>
+          </a:p>
+          <a:p>
+            <a:pPr marL="171450" indent="-171450">
+              <a:buFont typeface="Arial" charset="0"/>
+              <a:buChar char="•"/>
+            </a:pPr>
+            <a:r>
+              <a:rPr lang="en-US" sz="1200" kern="1200" dirty="0" smtClean="0">
+                <a:solidFill>
+                  <a:schemeClr val="tx1"/>
+                </a:solidFill>
+                <a:effectLst/>
+                <a:latin typeface="+mn-lt"/>
+                <a:ea typeface="+mn-ea"/>
+                <a:cs typeface="+mn-cs"/>
+              </a:rPr>
+              <a:t>numPtr is pointing to (i.e. is holding the address of) x. So x now holds 25</a:t>
+            </a:r>
+          </a:p>
+          <a:p>
             <a:endParaRPr lang="en-US" dirty="0"/>
           </a:p>
         </p:txBody>
@@ -2034,7 +2624,7 @@
           <a:p>
             <a:fld id="{53A3F9FE-1503-3543-B430-F28961C3D43A}" type="slidenum">
               <a:rPr lang="en-US" smtClean="0"/>
-              <a:t>12</a:t>
+              <a:t>13</a:t>
             </a:fld>
             <a:endParaRPr lang="en-US"/>
           </a:p>
@@ -2043,7 +2633,7 @@
     </p:spTree>
     <p:extLst>
       <p:ext uri="{BB962C8B-B14F-4D97-AF65-F5344CB8AC3E}">
-        <p14:creationId xmlns:p14="http://schemas.microsoft.com/office/powerpoint/2010/main" val="371083508"/>
+        <p14:creationId xmlns:p14="http://schemas.microsoft.com/office/powerpoint/2010/main" val="1818823686"/>
       </p:ext>
     </p:extLst>
   </p:cSld>
@@ -2118,7 +2708,7 @@
           <a:p>
             <a:fld id="{53A3F9FE-1503-3543-B430-F28961C3D43A}" type="slidenum">
               <a:rPr lang="en-US" smtClean="0"/>
-              <a:t>13</a:t>
+              <a:t>14</a:t>
             </a:fld>
             <a:endParaRPr lang="en-US"/>
           </a:p>
@@ -2127,7 +2717,7 @@
     </p:spTree>
     <p:extLst>
       <p:ext uri="{BB962C8B-B14F-4D97-AF65-F5344CB8AC3E}">
-        <p14:creationId xmlns:p14="http://schemas.microsoft.com/office/powerpoint/2010/main" val="1818823686"/>
+        <p14:creationId xmlns:p14="http://schemas.microsoft.com/office/powerpoint/2010/main" val="902101073"/>
       </p:ext>
     </p:extLst>
   </p:cSld>
@@ -8285,7 +8875,7 @@
         <p:spPr>
           <a:xfrm>
             <a:off x="6096" y="6096"/>
-            <a:ext cx="9144000" cy="3577903"/>
+            <a:ext cx="9144000" cy="3531736"/>
           </a:xfrm>
           <a:prstGeom prst="rect">
             <a:avLst/>
@@ -8318,7 +8908,7 @@
               <a:buChar char="•"/>
             </a:pPr>
             <a:r>
-              <a:rPr lang="en-US" sz="2500" dirty="0" smtClean="0"/>
+              <a:rPr lang="en-US" sz="2500" dirty="0"/>
               <a:t>To declare a pointer in C++, use the * operator.</a:t>
             </a:r>
           </a:p>
@@ -8328,7 +8918,7 @@
               <a:buChar char="•"/>
             </a:pPr>
             <a:r>
-              <a:rPr lang="en-US" sz="2500" dirty="0" smtClean="0"/>
+              <a:rPr lang="en-US" sz="2500" dirty="0"/>
               <a:t>int *numPtr;</a:t>
             </a:r>
           </a:p>
@@ -8338,20 +8928,8 @@
               <a:buChar char="•"/>
             </a:pPr>
             <a:r>
-              <a:rPr lang="en-US" sz="2500" dirty="0" smtClean="0"/>
-              <a:t>Currently</a:t>
-            </a:r>
-            <a:r>
               <a:rPr lang="en-US" sz="2500" dirty="0"/>
-              <a:t>, numPtr points </a:t>
-            </a:r>
-            <a:r>
-              <a:rPr lang="en-US" sz="2500" dirty="0" smtClean="0"/>
-              <a:t>to </a:t>
-            </a:r>
-            <a:r>
-              <a:rPr lang="en-US" sz="2500" dirty="0" smtClean="0"/>
-              <a:t>an integer </a:t>
+              <a:t>Currently, numPtr points to an integer </a:t>
             </a:r>
           </a:p>
           <a:p>
@@ -8360,14 +8938,14 @@
               <a:buChar char="•"/>
             </a:pPr>
             <a:r>
-              <a:rPr lang="en-US" sz="2500" dirty="0" smtClean="0"/>
+              <a:rPr lang="en-US" sz="2500" dirty="0"/>
               <a:t>numPtr </a:t>
             </a:r>
             <a:r>
               <a:rPr lang="en-NZ" sz="2400" dirty="0"/>
               <a:t>value will be a memory address</a:t>
             </a:r>
-            <a:endParaRPr lang="en-US" sz="2500" dirty="0" smtClean="0"/>
+            <a:endParaRPr lang="en-US" sz="2500" dirty="0"/>
           </a:p>
           <a:p>
             <a:pPr marL="1657350" lvl="2" indent="-742950">
@@ -8375,14 +8953,10 @@
               <a:buChar char="•"/>
             </a:pPr>
             <a:r>
-              <a:rPr lang="en-NZ" sz="2400" dirty="0" smtClean="0"/>
-              <a:t>That memory address must </a:t>
-            </a:r>
-            <a:r>
-              <a:rPr lang="en-NZ" sz="2400" dirty="0"/>
-              <a:t>contain an integer</a:t>
-            </a:r>
-            <a:endParaRPr lang="en-US" sz="2500" dirty="0" smtClean="0"/>
+              <a:rPr lang="en-NZ" sz="2400"/>
+              <a:t>That memory address must contain an integer</a:t>
+            </a:r>
+            <a:endParaRPr lang="en-US" sz="2500" dirty="0"/>
           </a:p>
         </p:txBody>
       </p:sp>

</xml_diff>